<commit_message>
slides tweaked to reflect section wise budgeting
</commit_message>
<xml_diff>
--- a/ppirl-userstudy/static/images/tutorial/clickable/slides/instructions.pptx
+++ b/ppirl-userstudy/static/images/tutorial/clickable/slides/instructions.pptx
@@ -224,7 +224,7 @@
           <a:p>
             <a:fld id="{06CA8D52-7F3F-48AA-91CF-879C8E49DD14}" type="datetimeFigureOut">
               <a:rPr lang="en-US" smtClean="0"/>
-              <a:t>3/21/2018</a:t>
+              <a:t>4/5/2018</a:t>
             </a:fld>
             <a:endParaRPr lang="en-US"/>
           </a:p>
@@ -728,7 +728,7 @@
           <a:p>
             <a:fld id="{6AD6EE87-EBD5-4F12-A48A-63ACA297AC8F}" type="datetimeFigureOut">
               <a:rPr lang="en-US" dirty="0"/>
-              <a:t>3/21/2018</a:t>
+              <a:t>4/5/2018</a:t>
             </a:fld>
             <a:endParaRPr lang="en-US"/>
           </a:p>
@@ -979,7 +979,7 @@
           <a:p>
             <a:fld id="{0CCB6AF7-0F13-426E-A112-0B4F2C8E6F7C}" type="datetimeFigureOut">
               <a:rPr lang="en-US" smtClean="0"/>
-              <a:t>3/21/2018</a:t>
+              <a:t>4/5/2018</a:t>
             </a:fld>
             <a:endParaRPr lang="en-US"/>
           </a:p>
@@ -1157,7 +1157,7 @@
           <a:p>
             <a:fld id="{0CCB6AF7-0F13-426E-A112-0B4F2C8E6F7C}" type="datetimeFigureOut">
               <a:rPr lang="en-US" smtClean="0"/>
-              <a:t>3/21/2018</a:t>
+              <a:t>4/5/2018</a:t>
             </a:fld>
             <a:endParaRPr lang="en-US"/>
           </a:p>
@@ -1360,7 +1360,7 @@
           <a:p>
             <a:fld id="{0CCB6AF7-0F13-426E-A112-0B4F2C8E6F7C}" type="datetimeFigureOut">
               <a:rPr lang="en-US" smtClean="0"/>
-              <a:t>3/21/2018</a:t>
+              <a:t>4/5/2018</a:t>
             </a:fld>
             <a:endParaRPr lang="en-US"/>
           </a:p>
@@ -1616,7 +1616,7 @@
           <a:p>
             <a:fld id="{0CCB6AF7-0F13-426E-A112-0B4F2C8E6F7C}" type="datetimeFigureOut">
               <a:rPr lang="en-US" smtClean="0"/>
-              <a:t>3/21/2018</a:t>
+              <a:t>4/5/2018</a:t>
             </a:fld>
             <a:endParaRPr lang="en-US"/>
           </a:p>
@@ -1933,7 +1933,7 @@
           <a:p>
             <a:fld id="{0CCB6AF7-0F13-426E-A112-0B4F2C8E6F7C}" type="datetimeFigureOut">
               <a:rPr lang="en-US" smtClean="0"/>
-              <a:t>3/21/2018</a:t>
+              <a:t>4/5/2018</a:t>
             </a:fld>
             <a:endParaRPr lang="en-US"/>
           </a:p>
@@ -2328,7 +2328,7 @@
           <a:p>
             <a:fld id="{0CCB6AF7-0F13-426E-A112-0B4F2C8E6F7C}" type="datetimeFigureOut">
               <a:rPr lang="en-US" smtClean="0"/>
-              <a:t>3/21/2018</a:t>
+              <a:t>4/5/2018</a:t>
             </a:fld>
             <a:endParaRPr lang="en-US"/>
           </a:p>
@@ -2445,7 +2445,7 @@
           <a:p>
             <a:fld id="{67EF4D4C-5367-4C26-9E2B-D8088D7FCA81}" type="datetimeFigureOut">
               <a:rPr lang="en-US" dirty="0"/>
-              <a:t>3/21/2018</a:t>
+              <a:t>4/5/2018</a:t>
             </a:fld>
             <a:endParaRPr lang="en-US"/>
           </a:p>
@@ -2540,7 +2540,7 @@
           <a:p>
             <a:fld id="{0CCB6AF7-0F13-426E-A112-0B4F2C8E6F7C}" type="datetimeFigureOut">
               <a:rPr lang="en-US" smtClean="0"/>
-              <a:t>3/21/2018</a:t>
+              <a:t>4/5/2018</a:t>
             </a:fld>
             <a:endParaRPr lang="en-US"/>
           </a:p>
@@ -2828,7 +2828,7 @@
           <a:p>
             <a:fld id="{0CCB6AF7-0F13-426E-A112-0B4F2C8E6F7C}" type="datetimeFigureOut">
               <a:rPr lang="en-US" smtClean="0"/>
-              <a:t>3/21/2018</a:t>
+              <a:t>4/5/2018</a:t>
             </a:fld>
             <a:endParaRPr lang="en-US"/>
           </a:p>
@@ -3106,7 +3106,7 @@
           <a:p>
             <a:fld id="{0CCB6AF7-0F13-426E-A112-0B4F2C8E6F7C}" type="datetimeFigureOut">
               <a:rPr lang="en-US" smtClean="0"/>
-              <a:t>3/21/2018</a:t>
+              <a:t>4/5/2018</a:t>
             </a:fld>
             <a:endParaRPr lang="en-US"/>
           </a:p>
@@ -5477,17 +5477,17 @@
           </a:lstStyle>
           <a:p>
             <a:r>
-              <a:rPr lang="en-IN"/>
+              <a:rPr lang="en-IN" dirty="0"/>
               <a:t>100% (the full meter) is when all cells are fully open</a:t>
             </a:r>
           </a:p>
           <a:p>
             <a:r>
-              <a:rPr lang="en-IN"/>
+              <a:rPr lang="en-IN" dirty="0"/>
               <a:t>What is the </a:t>
             </a:r>
             <a:r>
-              <a:rPr lang="en-IN" b="1">
+              <a:rPr lang="en-IN" b="1" dirty="0">
                 <a:solidFill>
                   <a:srgbClr val="C00000"/>
                 </a:solidFill>
@@ -5495,43 +5495,50 @@
               <a:t>solid red line on the meter</a:t>
             </a:r>
             <a:r>
-              <a:rPr lang="en-IN"/>
+              <a:rPr lang="en-IN" dirty="0"/>
               <a:t>?</a:t>
             </a:r>
           </a:p>
           <a:p>
             <a:pPr lvl="1"/>
             <a:r>
-              <a:rPr lang="en-IN"/>
+              <a:rPr lang="en-IN" dirty="0"/>
               <a:t>This is the </a:t>
             </a:r>
             <a:r>
-              <a:rPr lang="en-IN" b="1">
+              <a:rPr lang="en-IN" b="1" dirty="0">
                 <a:solidFill>
                   <a:srgbClr val="C00000"/>
                 </a:solidFill>
               </a:rPr>
-              <a:t>maximum budget you have to spend (open up cells)</a:t>
+              <a:t>maximum budget you have to spend (open up cells) per section</a:t>
+            </a:r>
+          </a:p>
+          <a:p>
+            <a:pPr lvl="2"/>
+            <a:r>
+              <a:rPr lang="en-IN" dirty="0"/>
+              <a:t>You have multiple sections, and each section is given a budget</a:t>
             </a:r>
           </a:p>
           <a:p>
             <a:pPr lvl="1"/>
             <a:r>
-              <a:rPr lang="en-IN"/>
+              <a:rPr lang="en-IN" dirty="0"/>
               <a:t>You will not be able to open anything else after you reach the solid red line.</a:t>
             </a:r>
           </a:p>
           <a:p>
             <a:pPr lvl="1"/>
             <a:r>
-              <a:rPr lang="en-IN"/>
+              <a:rPr lang="en-IN" dirty="0"/>
               <a:t>If you reach the bar, then for the rest of the questions, you’ll have to make the best choice you can without opening anything else.</a:t>
             </a:r>
           </a:p>
           <a:p>
             <a:pPr lvl="1"/>
             <a:r>
-              <a:rPr lang="en-IN"/>
+              <a:rPr lang="en-IN" dirty="0"/>
               <a:t>Be careful to only open cells that you need to make your decision.</a:t>
             </a:r>
           </a:p>
@@ -5781,7 +5788,7 @@
           </a:prstGeom>
         </p:spPr>
         <p:txBody>
-          <a:bodyPr vert="horz" lIns="45720" tIns="45720" rIns="45720" bIns="45720" rtlCol="0">
+          <a:bodyPr vert="horz" lIns="45720" tIns="45720" rIns="45720" bIns="45720" rtlCol="0" anchor="t">
             <a:normAutofit/>
           </a:bodyPr>
           <a:lstStyle>
@@ -6005,22 +6012,40 @@
           </a:lstStyle>
           <a:p>
             <a:r>
-              <a:rPr lang="en-IN"/>
-              <a:t>You have a total up to the solid red line to spend on answering all 36 questions over 6 pages</a:t>
-            </a:r>
-          </a:p>
-          <a:p>
-            <a:endParaRPr lang="en-IN"/>
-          </a:p>
-          <a:p>
-            <a:r>
-              <a:rPr lang="en-IN"/>
+              <a:rPr lang="en-IN" dirty="0"/>
+              <a:t>You have a total up to the solid red line to spend on answering </a:t>
+            </a:r>
+          </a:p>
+          <a:p>
+            <a:r>
+              <a:rPr lang="en-IN" b="1" dirty="0">
+                <a:solidFill>
+                  <a:srgbClr val="C00000"/>
+                </a:solidFill>
+              </a:rPr>
+              <a:t>all 36 questions over 6 pages that makes up one section</a:t>
+            </a:r>
+            <a:r>
+              <a:rPr lang="en-IN" dirty="0">
+                <a:solidFill>
+                  <a:srgbClr val="C00000"/>
+                </a:solidFill>
+              </a:rPr>
+              <a:t>.</a:t>
+            </a:r>
+          </a:p>
+          <a:p>
+            <a:endParaRPr lang="en-IN" dirty="0"/>
+          </a:p>
+          <a:p>
+            <a:r>
+              <a:rPr lang="en-IN" dirty="0"/>
               <a:t>So, try not to use all of it on the first page. </a:t>
             </a:r>
           </a:p>
           <a:p>
             <a:r>
-              <a:rPr lang="en-IN"/>
+              <a:rPr lang="en-IN" dirty="0"/>
               <a:t>Instead, try to spend roughly 1/6 on each page. </a:t>
             </a:r>
           </a:p>

</xml_diff>